<commit_message>
Final touches for first submission to OA
</commit_message>
<xml_diff>
--- a/outputs/forpub/extras/Presentation1.pptx
+++ b/outputs/forpub/extras/Presentation1.pptx
@@ -104,6 +104,11 @@
       </a:defRPr>
     </a:lvl9pPr>
   </p:defaultTextStyle>
+  <p:extLst>
+    <p:ext uri="{EFAFB233-063F-42B5-8137-9DF3F51BA10A}">
+      <p15:sldGuideLst xmlns:p15="http://schemas.microsoft.com/office/powerpoint/2012/main"/>
+    </p:ext>
+  </p:extLst>
 </p:presentation>
 </file>
 
@@ -254,7 +259,7 @@
           <a:p>
             <a:fld id="{FC13DB13-B93F-CF45-AA87-2071B4F55E66}" type="datetimeFigureOut">
               <a:rPr lang="en-US" smtClean="0"/>
-              <a:t>4/24/25</a:t>
+              <a:t>6/2/25</a:t>
             </a:fld>
             <a:endParaRPr lang="en-US"/>
           </a:p>
@@ -452,7 +457,7 @@
           <a:p>
             <a:fld id="{FC13DB13-B93F-CF45-AA87-2071B4F55E66}" type="datetimeFigureOut">
               <a:rPr lang="en-US" smtClean="0"/>
-              <a:t>4/24/25</a:t>
+              <a:t>6/2/25</a:t>
             </a:fld>
             <a:endParaRPr lang="en-US"/>
           </a:p>
@@ -660,7 +665,7 @@
           <a:p>
             <a:fld id="{FC13DB13-B93F-CF45-AA87-2071B4F55E66}" type="datetimeFigureOut">
               <a:rPr lang="en-US" smtClean="0"/>
-              <a:t>4/24/25</a:t>
+              <a:t>6/2/25</a:t>
             </a:fld>
             <a:endParaRPr lang="en-US"/>
           </a:p>
@@ -858,7 +863,7 @@
           <a:p>
             <a:fld id="{FC13DB13-B93F-CF45-AA87-2071B4F55E66}" type="datetimeFigureOut">
               <a:rPr lang="en-US" smtClean="0"/>
-              <a:t>4/24/25</a:t>
+              <a:t>6/2/25</a:t>
             </a:fld>
             <a:endParaRPr lang="en-US"/>
           </a:p>
@@ -1133,7 +1138,7 @@
           <a:p>
             <a:fld id="{FC13DB13-B93F-CF45-AA87-2071B4F55E66}" type="datetimeFigureOut">
               <a:rPr lang="en-US" smtClean="0"/>
-              <a:t>4/24/25</a:t>
+              <a:t>6/2/25</a:t>
             </a:fld>
             <a:endParaRPr lang="en-US"/>
           </a:p>
@@ -1398,7 +1403,7 @@
           <a:p>
             <a:fld id="{FC13DB13-B93F-CF45-AA87-2071B4F55E66}" type="datetimeFigureOut">
               <a:rPr lang="en-US" smtClean="0"/>
-              <a:t>4/24/25</a:t>
+              <a:t>6/2/25</a:t>
             </a:fld>
             <a:endParaRPr lang="en-US"/>
           </a:p>
@@ -1810,7 +1815,7 @@
           <a:p>
             <a:fld id="{FC13DB13-B93F-CF45-AA87-2071B4F55E66}" type="datetimeFigureOut">
               <a:rPr lang="en-US" smtClean="0"/>
-              <a:t>4/24/25</a:t>
+              <a:t>6/2/25</a:t>
             </a:fld>
             <a:endParaRPr lang="en-US"/>
           </a:p>
@@ -1951,7 +1956,7 @@
           <a:p>
             <a:fld id="{FC13DB13-B93F-CF45-AA87-2071B4F55E66}" type="datetimeFigureOut">
               <a:rPr lang="en-US" smtClean="0"/>
-              <a:t>4/24/25</a:t>
+              <a:t>6/2/25</a:t>
             </a:fld>
             <a:endParaRPr lang="en-US"/>
           </a:p>
@@ -2064,7 +2069,7 @@
           <a:p>
             <a:fld id="{FC13DB13-B93F-CF45-AA87-2071B4F55E66}" type="datetimeFigureOut">
               <a:rPr lang="en-US" smtClean="0"/>
-              <a:t>4/24/25</a:t>
+              <a:t>6/2/25</a:t>
             </a:fld>
             <a:endParaRPr lang="en-US"/>
           </a:p>
@@ -2375,7 +2380,7 @@
           <a:p>
             <a:fld id="{FC13DB13-B93F-CF45-AA87-2071B4F55E66}" type="datetimeFigureOut">
               <a:rPr lang="en-US" smtClean="0"/>
-              <a:t>4/24/25</a:t>
+              <a:t>6/2/25</a:t>
             </a:fld>
             <a:endParaRPr lang="en-US"/>
           </a:p>
@@ -2663,7 +2668,7 @@
           <a:p>
             <a:fld id="{FC13DB13-B93F-CF45-AA87-2071B4F55E66}" type="datetimeFigureOut">
               <a:rPr lang="en-US" smtClean="0"/>
-              <a:t>4/24/25</a:t>
+              <a:t>6/2/25</a:t>
             </a:fld>
             <a:endParaRPr lang="en-US"/>
           </a:p>
@@ -2904,7 +2909,7 @@
           <a:p>
             <a:fld id="{FC13DB13-B93F-CF45-AA87-2071B4F55E66}" type="datetimeFigureOut">
               <a:rPr lang="en-US" smtClean="0"/>
-              <a:t>4/24/25</a:t>
+              <a:t>6/2/25</a:t>
             </a:fld>
             <a:endParaRPr lang="en-US"/>
           </a:p>
@@ -3323,7 +3328,7 @@
       </p:grpSpPr>
       <p:pic>
         <p:nvPicPr>
-          <p:cNvPr id="5" name="Picture 4" descr="A graph of a number of different types of plants&#10;&#10;AI-generated content may be incorrect.">
+          <p:cNvPr id="5" name="Picture 4">
             <a:extLst>
               <a:ext uri="{FF2B5EF4-FFF2-40B4-BE49-F238E27FC236}">
                 <a16:creationId xmlns:a16="http://schemas.microsoft.com/office/drawing/2014/main" id="{7F66219B-9A8A-AB70-A751-54EFE702047C}"/>
@@ -3337,14 +3342,13 @@
         </p:nvPicPr>
         <p:blipFill>
           <a:blip r:embed="rId2"/>
-          <a:stretch>
-            <a:fillRect/>
-          </a:stretch>
+          <a:srcRect/>
+          <a:stretch/>
         </p:blipFill>
         <p:spPr>
           <a:xfrm>
             <a:off x="1561475" y="0"/>
-            <a:ext cx="7387653" cy="6859964"/>
+            <a:ext cx="7387653" cy="6859963"/>
           </a:xfrm>
           <a:prstGeom prst="rect">
             <a:avLst/>
@@ -3353,10 +3357,10 @@
       </p:pic>
       <p:sp>
         <p:nvSpPr>
-          <p:cNvPr id="6" name="TextBox 5">
-            <a:extLst>
-              <a:ext uri="{FF2B5EF4-FFF2-40B4-BE49-F238E27FC236}">
-                <a16:creationId xmlns:a16="http://schemas.microsoft.com/office/drawing/2014/main" id="{6154290E-B6AB-26D1-6BF7-B4F5004C4862}"/>
+          <p:cNvPr id="7" name="TextBox 6">
+            <a:extLst>
+              <a:ext uri="{FF2B5EF4-FFF2-40B4-BE49-F238E27FC236}">
+                <a16:creationId xmlns:a16="http://schemas.microsoft.com/office/drawing/2014/main" id="{126835D2-D51F-FCA6-681E-D414A38BE39B}"/>
               </a:ext>
             </a:extLst>
           </p:cNvPr>
@@ -3365,7 +3369,7 @@
         </p:nvSpPr>
         <p:spPr>
           <a:xfrm>
-            <a:off x="2456688" y="241594"/>
+            <a:off x="4065016" y="241594"/>
             <a:ext cx="329183" cy="461665"/>
           </a:xfrm>
           <a:prstGeom prst="rect">
@@ -3389,10 +3393,10 @@
       </p:sp>
       <p:sp>
         <p:nvSpPr>
-          <p:cNvPr id="7" name="TextBox 6">
-            <a:extLst>
-              <a:ext uri="{FF2B5EF4-FFF2-40B4-BE49-F238E27FC236}">
-                <a16:creationId xmlns:a16="http://schemas.microsoft.com/office/drawing/2014/main" id="{126835D2-D51F-FCA6-681E-D414A38BE39B}"/>
+          <p:cNvPr id="2" name="TextBox 1">
+            <a:extLst>
+              <a:ext uri="{FF2B5EF4-FFF2-40B4-BE49-F238E27FC236}">
+                <a16:creationId xmlns:a16="http://schemas.microsoft.com/office/drawing/2014/main" id="{0F949C3F-EBB4-12B5-0573-FBD10A75E92B}"/>
               </a:ext>
             </a:extLst>
           </p:cNvPr>
@@ -3401,7 +3405,7 @@
         </p:nvSpPr>
         <p:spPr>
           <a:xfrm>
-            <a:off x="4065016" y="241594"/>
+            <a:off x="2456687" y="4890580"/>
             <a:ext cx="329183" cy="461665"/>
           </a:xfrm>
           <a:prstGeom prst="rect">

</xml_diff>